<commit_message>
Added more slides for discussion after students are done with hands-on portion of lecture.
</commit_message>
<xml_diff>
--- a/GitSlides.pptx
+++ b/GitSlides.pptx
@@ -13,6 +13,9 @@
     <p:sldId id="261" r:id="rId7"/>
     <p:sldId id="262" r:id="rId8"/>
     <p:sldId id="263" r:id="rId9"/>
+    <p:sldId id="264" r:id="rId10"/>
+    <p:sldId id="265" r:id="rId11"/>
+    <p:sldId id="266" r:id="rId12"/>
   </p:sldIdLst>
   <p:sldSz cx="12192000" cy="6858000"/>
   <p:notesSz cx="6858000" cy="9144000"/>
@@ -111,6 +114,11 @@
       </a:defRPr>
     </a:lvl9pPr>
   </p:defaultTextStyle>
+  <p:extLst>
+    <p:ext uri="{EFAFB233-063F-42B5-8137-9DF3F51BA10A}">
+      <p15:sldGuideLst xmlns:p15="http://schemas.microsoft.com/office/powerpoint/2012/main"/>
+    </p:ext>
+  </p:extLst>
 </p:presentation>
 </file>
 
@@ -7730,6 +7738,210 @@
     <p:extLst>
       <p:ext uri="{BB962C8B-B14F-4D97-AF65-F5344CB8AC3E}">
         <p14:creationId xmlns:p14="http://schemas.microsoft.com/office/powerpoint/2010/main" val="1530365932"/>
+      </p:ext>
+    </p:extLst>
+  </p:cSld>
+  <p:clrMapOvr>
+    <a:masterClrMapping/>
+  </p:clrMapOvr>
+</p:sld>
+</file>
+
+<file path=ppt/slides/slide10.xml><?xml version="1.0" encoding="utf-8"?>
+<p:sld xmlns:a="http://schemas.openxmlformats.org/drawingml/2006/main" xmlns:r="http://schemas.openxmlformats.org/officeDocument/2006/relationships" xmlns:p="http://schemas.openxmlformats.org/presentationml/2006/main">
+  <p:cSld>
+    <p:spTree>
+      <p:nvGrpSpPr>
+        <p:cNvPr id="1" name=""/>
+        <p:cNvGrpSpPr/>
+        <p:nvPr/>
+      </p:nvGrpSpPr>
+      <p:grpSpPr>
+        <a:xfrm>
+          <a:off x="0" y="0"/>
+          <a:ext cx="0" cy="0"/>
+          <a:chOff x="0" y="0"/>
+          <a:chExt cx="0" cy="0"/>
+        </a:xfrm>
+      </p:grpSpPr>
+      <p:sp>
+        <p:nvSpPr>
+          <p:cNvPr id="2" name="Title 1">
+            <a:extLst>
+              <a:ext uri="{FF2B5EF4-FFF2-40B4-BE49-F238E27FC236}">
+                <a16:creationId xmlns:a16="http://schemas.microsoft.com/office/drawing/2014/main" id="{B47CE9BA-E9C6-444C-AAD9-2FFC4FEFEE68}"/>
+              </a:ext>
+            </a:extLst>
+          </p:cNvPr>
+          <p:cNvSpPr>
+            <a:spLocks noGrp="1"/>
+          </p:cNvSpPr>
+          <p:nvPr>
+            <p:ph type="title"/>
+          </p:nvPr>
+        </p:nvSpPr>
+        <p:spPr/>
+        <p:txBody>
+          <a:bodyPr/>
+          <a:lstStyle/>
+          <a:p>
+            <a:r>
+              <a:rPr lang="en-US" dirty="0"/>
+              <a:t>Some general notes</a:t>
+            </a:r>
+          </a:p>
+        </p:txBody>
+      </p:sp>
+      <p:sp>
+        <p:nvSpPr>
+          <p:cNvPr id="3" name="Content Placeholder 2">
+            <a:extLst>
+              <a:ext uri="{FF2B5EF4-FFF2-40B4-BE49-F238E27FC236}">
+                <a16:creationId xmlns:a16="http://schemas.microsoft.com/office/drawing/2014/main" id="{D6D5EB8F-5B16-4796-A440-C39AAAC8F9E0}"/>
+              </a:ext>
+            </a:extLst>
+          </p:cNvPr>
+          <p:cNvSpPr>
+            <a:spLocks noGrp="1"/>
+          </p:cNvSpPr>
+          <p:nvPr>
+            <p:ph idx="1"/>
+          </p:nvPr>
+        </p:nvSpPr>
+        <p:spPr/>
+        <p:txBody>
+          <a:bodyPr/>
+          <a:lstStyle/>
+          <a:p>
+            <a:r>
+              <a:rPr lang="en-US" dirty="0"/>
+              <a:t>Commit every time you add a new feature and it works</a:t>
+            </a:r>
+          </a:p>
+          <a:p>
+            <a:pPr lvl="1"/>
+            <a:r>
+              <a:rPr lang="en-US" dirty="0"/>
+              <a:t>Typically a few times per hour</a:t>
+            </a:r>
+          </a:p>
+          <a:p>
+            <a:r>
+              <a:rPr lang="en-US" dirty="0"/>
+              <a:t>Merge toward master/develop only when feature is tested to be working with the rest of the system</a:t>
+            </a:r>
+          </a:p>
+          <a:p>
+            <a:r>
+              <a:rPr lang="en-US" dirty="0"/>
+              <a:t>This gets easier the more you use it!</a:t>
+            </a:r>
+          </a:p>
+          <a:p>
+            <a:pPr lvl="1"/>
+            <a:r>
+              <a:rPr lang="en-US" dirty="0"/>
+              <a:t>Feel free to try it out on homework, projects, etc.</a:t>
+            </a:r>
+          </a:p>
+          <a:p>
+            <a:pPr lvl="1"/>
+            <a:r>
+              <a:rPr lang="en-US" dirty="0"/>
+              <a:t>This </a:t>
+            </a:r>
+            <a:r>
+              <a:rPr lang="en-US" b="1" i="1" dirty="0"/>
+              <a:t>WILL</a:t>
+            </a:r>
+            <a:r>
+              <a:rPr lang="en-US" dirty="0"/>
+              <a:t> be used for all Robotics Club software</a:t>
+            </a:r>
+          </a:p>
+        </p:txBody>
+      </p:sp>
+    </p:spTree>
+    <p:extLst>
+      <p:ext uri="{BB962C8B-B14F-4D97-AF65-F5344CB8AC3E}">
+        <p14:creationId xmlns:p14="http://schemas.microsoft.com/office/powerpoint/2010/main" val="3027398209"/>
+      </p:ext>
+    </p:extLst>
+  </p:cSld>
+  <p:clrMapOvr>
+    <a:masterClrMapping/>
+  </p:clrMapOvr>
+</p:sld>
+</file>
+
+<file path=ppt/slides/slide11.xml><?xml version="1.0" encoding="utf-8"?>
+<p:sld xmlns:a="http://schemas.openxmlformats.org/drawingml/2006/main" xmlns:r="http://schemas.openxmlformats.org/officeDocument/2006/relationships" xmlns:p="http://schemas.openxmlformats.org/presentationml/2006/main">
+  <p:cSld>
+    <p:spTree>
+      <p:nvGrpSpPr>
+        <p:cNvPr id="1" name=""/>
+        <p:cNvGrpSpPr/>
+        <p:nvPr/>
+      </p:nvGrpSpPr>
+      <p:grpSpPr>
+        <a:xfrm>
+          <a:off x="0" y="0"/>
+          <a:ext cx="0" cy="0"/>
+          <a:chOff x="0" y="0"/>
+          <a:chExt cx="0" cy="0"/>
+        </a:xfrm>
+      </p:grpSpPr>
+      <p:pic>
+        <p:nvPicPr>
+          <p:cNvPr id="1026" name="Picture 2" descr="https://i.stack.imgur.com/jbxOX.png">
+            <a:extLst>
+              <a:ext uri="{FF2B5EF4-FFF2-40B4-BE49-F238E27FC236}">
+                <a16:creationId xmlns:a16="http://schemas.microsoft.com/office/drawing/2014/main" id="{A15B171C-D2A1-4C70-A0A4-8DAC75591DE3}"/>
+              </a:ext>
+            </a:extLst>
+          </p:cNvPr>
+          <p:cNvPicPr>
+            <a:picLocks noChangeAspect="1" noChangeArrowheads="1"/>
+          </p:cNvPicPr>
+          <p:nvPr/>
+        </p:nvPicPr>
+        <p:blipFill>
+          <a:blip r:embed="rId2">
+            <a:extLst>
+              <a:ext uri="{28A0092B-C50C-407E-A947-70E740481C1C}">
+                <a14:useLocalDpi xmlns:a14="http://schemas.microsoft.com/office/drawing/2010/main" val="0"/>
+              </a:ext>
+            </a:extLst>
+          </a:blip>
+          <a:srcRect/>
+          <a:stretch>
+            <a:fillRect/>
+          </a:stretch>
+        </p:blipFill>
+        <p:spPr bwMode="auto">
+          <a:xfrm>
+            <a:off x="3524250" y="0"/>
+            <a:ext cx="5141913" cy="6858000"/>
+          </a:xfrm>
+          <a:prstGeom prst="rect">
+            <a:avLst/>
+          </a:prstGeom>
+          <a:noFill/>
+          <a:extLst>
+            <a:ext uri="{909E8E84-426E-40DD-AFC4-6F175D3DCCD1}">
+              <a14:hiddenFill xmlns:a14="http://schemas.microsoft.com/office/drawing/2010/main">
+                <a:solidFill>
+                  <a:srgbClr val="FFFFFF"/>
+                </a:solidFill>
+              </a14:hiddenFill>
+            </a:ext>
+          </a:extLst>
+        </p:spPr>
+      </p:pic>
+    </p:spTree>
+    <p:extLst>
+      <p:ext uri="{BB962C8B-B14F-4D97-AF65-F5344CB8AC3E}">
+        <p14:creationId xmlns:p14="http://schemas.microsoft.com/office/powerpoint/2010/main" val="3795911524"/>
       </p:ext>
     </p:extLst>
   </p:cSld>
@@ -9252,6 +9464,187 @@
 </p:sld>
 </file>
 
+<file path=ppt/slides/slide9.xml><?xml version="1.0" encoding="utf-8"?>
+<p:sld xmlns:a="http://schemas.openxmlformats.org/drawingml/2006/main" xmlns:r="http://schemas.openxmlformats.org/officeDocument/2006/relationships" xmlns:p="http://schemas.openxmlformats.org/presentationml/2006/main">
+  <p:cSld>
+    <p:spTree>
+      <p:nvGrpSpPr>
+        <p:cNvPr id="1" name=""/>
+        <p:cNvGrpSpPr/>
+        <p:nvPr/>
+      </p:nvGrpSpPr>
+      <p:grpSpPr>
+        <a:xfrm>
+          <a:off x="0" y="0"/>
+          <a:ext cx="0" cy="0"/>
+          <a:chOff x="0" y="0"/>
+          <a:chExt cx="0" cy="0"/>
+        </a:xfrm>
+      </p:grpSpPr>
+      <p:sp>
+        <p:nvSpPr>
+          <p:cNvPr id="2" name="Title 1">
+            <a:extLst>
+              <a:ext uri="{FF2B5EF4-FFF2-40B4-BE49-F238E27FC236}">
+                <a16:creationId xmlns:a16="http://schemas.microsoft.com/office/drawing/2014/main" id="{0B170454-F26F-4FA5-9092-3A02180F4757}"/>
+              </a:ext>
+            </a:extLst>
+          </p:cNvPr>
+          <p:cNvSpPr>
+            <a:spLocks noGrp="1"/>
+          </p:cNvSpPr>
+          <p:nvPr>
+            <p:ph type="title"/>
+          </p:nvPr>
+        </p:nvSpPr>
+        <p:spPr/>
+        <p:txBody>
+          <a:bodyPr/>
+          <a:lstStyle/>
+          <a:p>
+            <a:r>
+              <a:rPr lang="en-US" dirty="0"/>
+              <a:t>What did we learn?</a:t>
+            </a:r>
+          </a:p>
+        </p:txBody>
+      </p:sp>
+      <p:sp>
+        <p:nvSpPr>
+          <p:cNvPr id="3" name="Content Placeholder 2">
+            <a:extLst>
+              <a:ext uri="{FF2B5EF4-FFF2-40B4-BE49-F238E27FC236}">
+                <a16:creationId xmlns:a16="http://schemas.microsoft.com/office/drawing/2014/main" id="{CE442BF7-3BBE-4B29-A509-66A0E2567411}"/>
+              </a:ext>
+            </a:extLst>
+          </p:cNvPr>
+          <p:cNvSpPr>
+            <a:spLocks noGrp="1"/>
+          </p:cNvSpPr>
+          <p:nvPr>
+            <p:ph idx="1"/>
+          </p:nvPr>
+        </p:nvSpPr>
+        <p:spPr/>
+        <p:txBody>
+          <a:bodyPr/>
+          <a:lstStyle/>
+          <a:p>
+            <a:r>
+              <a:rPr lang="en-US" b="1" dirty="0"/>
+              <a:t>clone</a:t>
+            </a:r>
+            <a:r>
+              <a:rPr lang="en-US" dirty="0"/>
+              <a:t> to get repositories from the internet</a:t>
+            </a:r>
+            <a:r>
+              <a:rPr lang="en-US" b="1" dirty="0"/>
+              <a:t> </a:t>
+            </a:r>
+            <a:r>
+              <a:rPr lang="en-US" dirty="0"/>
+              <a:t>(for starting repos from scratch, use git </a:t>
+            </a:r>
+            <a:r>
+              <a:rPr lang="en-US" b="1" dirty="0" err="1"/>
+              <a:t>init</a:t>
+            </a:r>
+            <a:r>
+              <a:rPr lang="en-US" dirty="0"/>
+              <a:t>)</a:t>
+            </a:r>
+          </a:p>
+          <a:p>
+            <a:r>
+              <a:rPr lang="en-US" b="1" dirty="0"/>
+              <a:t>branch </a:t>
+            </a:r>
+            <a:r>
+              <a:rPr lang="en-US" dirty="0"/>
+              <a:t>to view and add branches</a:t>
+            </a:r>
+            <a:endParaRPr lang="en-US" b="1" dirty="0"/>
+          </a:p>
+          <a:p>
+            <a:r>
+              <a:rPr lang="en-US" b="1" dirty="0"/>
+              <a:t>checkout</a:t>
+            </a:r>
+            <a:r>
+              <a:rPr lang="en-US" dirty="0"/>
+              <a:t> to switch between branches</a:t>
+            </a:r>
+          </a:p>
+          <a:p>
+            <a:r>
+              <a:rPr lang="en-US" b="1" dirty="0"/>
+              <a:t>add </a:t>
+            </a:r>
+            <a:r>
+              <a:rPr lang="en-US" dirty="0"/>
+              <a:t>and </a:t>
+            </a:r>
+            <a:r>
+              <a:rPr lang="en-US" b="1" dirty="0"/>
+              <a:t>commit</a:t>
+            </a:r>
+            <a:r>
+              <a:rPr lang="en-US" dirty="0"/>
+              <a:t> to save iterations of our project</a:t>
+            </a:r>
+          </a:p>
+          <a:p>
+            <a:r>
+              <a:rPr lang="en-US" b="1" dirty="0"/>
+              <a:t>merge</a:t>
+            </a:r>
+            <a:r>
+              <a:rPr lang="en-US" dirty="0"/>
+              <a:t> to combine branches</a:t>
+            </a:r>
+          </a:p>
+          <a:p>
+            <a:r>
+              <a:rPr lang="en-US" b="1" dirty="0"/>
+              <a:t>push</a:t>
+            </a:r>
+            <a:r>
+              <a:rPr lang="en-US" dirty="0"/>
+              <a:t>, </a:t>
+            </a:r>
+            <a:r>
+              <a:rPr lang="en-US" b="1" dirty="0"/>
+              <a:t>pull</a:t>
+            </a:r>
+            <a:r>
+              <a:rPr lang="en-US" dirty="0"/>
+              <a:t>, and </a:t>
+            </a:r>
+            <a:r>
+              <a:rPr lang="en-US" b="1" dirty="0"/>
+              <a:t>fetch</a:t>
+            </a:r>
+            <a:r>
+              <a:rPr lang="en-US" dirty="0"/>
+              <a:t> to interact with remote repositories</a:t>
+            </a:r>
+          </a:p>
+        </p:txBody>
+      </p:sp>
+    </p:spTree>
+    <p:extLst>
+      <p:ext uri="{BB962C8B-B14F-4D97-AF65-F5344CB8AC3E}">
+        <p14:creationId xmlns:p14="http://schemas.microsoft.com/office/powerpoint/2010/main" val="3756163074"/>
+      </p:ext>
+    </p:extLst>
+  </p:cSld>
+  <p:clrMapOvr>
+    <a:masterClrMapping/>
+  </p:clrMapOvr>
+</p:sld>
+</file>
+
 <file path=ppt/theme/theme1.xml><?xml version="1.0" encoding="utf-8"?>
 <a:theme xmlns:a="http://schemas.openxmlformats.org/drawingml/2006/main" name="Berlin">
   <a:themeElements>

</xml_diff>